<commit_message>
PowerPoint ull logo edit
</commit_message>
<xml_diff>
--- a/IniciacionDePracticasExternas.pptx
+++ b/IniciacionDePracticasExternas.pptx
@@ -5555,10 +5555,10 @@
       </p:sp>
       <p:pic>
         <p:nvPicPr>
-          <p:cNvPr id="1028" name="Picture 4" descr="No es solo el logo - ULL - Noticias">
-            <a:extLst>
-              <a:ext uri="{FF2B5EF4-FFF2-40B4-BE49-F238E27FC236}">
-                <a16:creationId xmlns:a16="http://schemas.microsoft.com/office/drawing/2014/main" id="{1725CBC5-C9A3-46B4-9EB4-4CBD6AF162A2}"/>
+          <p:cNvPr id="1026" name="Picture 2" descr="Universidad de La Laguna (ULL) – 9º Encuentro BID">
+            <a:extLst>
+              <a:ext uri="{FF2B5EF4-FFF2-40B4-BE49-F238E27FC236}">
+                <a16:creationId xmlns:a16="http://schemas.microsoft.com/office/drawing/2014/main" id="{71F28010-16EF-4CBC-82AC-7C4159510DCB}"/>
               </a:ext>
             </a:extLst>
           </p:cNvPr>
@@ -5582,8 +5582,8 @@
         </p:blipFill>
         <p:spPr bwMode="auto">
           <a:xfrm>
-            <a:off x="-87086" y="5333605"/>
-            <a:ext cx="3723398" cy="2094411"/>
+            <a:off x="420194" y="5774111"/>
+            <a:ext cx="3715580" cy="890329"/>
           </a:xfrm>
           <a:prstGeom prst="rect">
             <a:avLst/>
@@ -6109,10 +6109,10 @@
       </p:sp>
       <p:pic>
         <p:nvPicPr>
-          <p:cNvPr id="5" name="Picture 4" descr="No es solo el logo - ULL - Noticias">
-            <a:extLst>
-              <a:ext uri="{FF2B5EF4-FFF2-40B4-BE49-F238E27FC236}">
-                <a16:creationId xmlns:a16="http://schemas.microsoft.com/office/drawing/2014/main" id="{4C1868E8-4087-4178-BE19-E7507A709BF0}"/>
+          <p:cNvPr id="2050" name="Picture 2" descr="Universidad de La Laguna (ULL) – 9º Encuentro BID">
+            <a:extLst>
+              <a:ext uri="{FF2B5EF4-FFF2-40B4-BE49-F238E27FC236}">
+                <a16:creationId xmlns:a16="http://schemas.microsoft.com/office/drawing/2014/main" id="{882940A1-F76E-46F8-8D6F-3B268F96020C}"/>
               </a:ext>
             </a:extLst>
           </p:cNvPr>
@@ -6136,8 +6136,8 @@
         </p:blipFill>
         <p:spPr bwMode="auto">
           <a:xfrm>
-            <a:off x="8485570" y="0"/>
-            <a:ext cx="1973424" cy="1110051"/>
+            <a:off x="8621351" y="295682"/>
+            <a:ext cx="1828935" cy="438250"/>
           </a:xfrm>
           <a:prstGeom prst="rect">
             <a:avLst/>
@@ -6918,10 +6918,10 @@
       </p:sp>
       <p:pic>
         <p:nvPicPr>
-          <p:cNvPr id="27" name="Picture 4" descr="No es solo el logo - ULL - Noticias">
-            <a:extLst>
-              <a:ext uri="{FF2B5EF4-FFF2-40B4-BE49-F238E27FC236}">
-                <a16:creationId xmlns:a16="http://schemas.microsoft.com/office/drawing/2014/main" id="{524674E9-2F4A-453B-B70F-A7E948CC44DA}"/>
+          <p:cNvPr id="29" name="Picture 2" descr="Universidad de La Laguna (ULL) – 9º Encuentro BID">
+            <a:extLst>
+              <a:ext uri="{FF2B5EF4-FFF2-40B4-BE49-F238E27FC236}">
+                <a16:creationId xmlns:a16="http://schemas.microsoft.com/office/drawing/2014/main" id="{8A5729B5-076D-4877-B435-899362EAB932}"/>
               </a:ext>
             </a:extLst>
           </p:cNvPr>
@@ -6945,8 +6945,8 @@
         </p:blipFill>
         <p:spPr bwMode="auto">
           <a:xfrm>
-            <a:off x="8485570" y="0"/>
-            <a:ext cx="1973424" cy="1110051"/>
+            <a:off x="8621351" y="295682"/>
+            <a:ext cx="1828935" cy="438250"/>
           </a:xfrm>
           <a:prstGeom prst="rect">
             <a:avLst/>
@@ -7503,57 +7503,6 @@
 </file>
 
 <file path=customXml/item1.xml><?xml version="1.0" encoding="utf-8"?>
-<p:properties xmlns:p="http://schemas.microsoft.com/office/2006/metadata/properties" xmlns:xsi="http://www.w3.org/2001/XMLSchema-instance" xmlns:pc="http://schemas.microsoft.com/office/infopath/2007/PartnerControls">
-  <documentManagement>
-    <TaxCatchAll xmlns="6dedcb10-c833-433a-ac85-a71007a78acc">
-      <Value>4</Value>
-      <Value>10</Value>
-      <Value>2</Value>
-      <Value>3</Value>
-    </TaxCatchAll>
-    <Abstract xmlns="51e2b858-bf58-46a2-91b2-3dafa82a619b" xsi:nil="true"/>
-    <neda87fc916d4e679a7e41b9a8103b08 xmlns="51e2b858-bf58-46a2-91b2-3dafa82a619b">
-      <Terms xmlns="http://schemas.microsoft.com/office/infopath/2007/PartnerControls">
-        <TermInfo xmlns="http://schemas.microsoft.com/office/infopath/2007/PartnerControls">
-          <TermName xmlns="http://schemas.microsoft.com/office/infopath/2007/PartnerControls">C - valid</TermName>
-          <TermId xmlns="http://schemas.microsoft.com/office/infopath/2007/PartnerControls">0c95109a-f409-44c4-ba27-12fbc6f76f24</TermId>
-        </TermInfo>
-      </Terms>
-    </neda87fc916d4e679a7e41b9a8103b08>
-    <j1058322525a448cbab87226107f51c4 xmlns="51e2b858-bf58-46a2-91b2-3dafa82a619b">
-      <Terms xmlns="http://schemas.microsoft.com/office/infopath/2007/PartnerControls">
-        <TermInfo xmlns="http://schemas.microsoft.com/office/infopath/2007/PartnerControls">
-          <TermName xmlns="http://schemas.microsoft.com/office/infopath/2007/PartnerControls">Documentation</TermName>
-          <TermId xmlns="http://schemas.microsoft.com/office/infopath/2007/PartnerControls">4374477c-d144-4e1f-bf15-77ba8dc2d6ee</TermId>
-        </TermInfo>
-      </Terms>
-    </j1058322525a448cbab87226107f51c4>
-    <fad0ae6618ec41d8bed90675241c3993 xmlns="51e2b858-bf58-46a2-91b2-3dafa82a619b">
-      <Terms xmlns="http://schemas.microsoft.com/office/infopath/2007/PartnerControls">
-        <TermInfo xmlns="http://schemas.microsoft.com/office/infopath/2007/PartnerControls">
-          <TermName xmlns="http://schemas.microsoft.com/office/infopath/2007/PartnerControls">A - internal</TermName>
-          <TermId xmlns="http://schemas.microsoft.com/office/infopath/2007/PartnerControls">b9f71f92-fb46-4487-9019-025349c14948</TermId>
-        </TermInfo>
-      </Terms>
-    </fad0ae6618ec41d8bed90675241c3993>
-    <ba46f578df2f4cc59a79294d268b0c87 xmlns="51e2b858-bf58-46a2-91b2-3dafa82a619b">
-      <Terms xmlns="http://schemas.microsoft.com/office/infopath/2007/PartnerControls">
-        <TermInfo xmlns="http://schemas.microsoft.com/office/infopath/2007/PartnerControls">
-          <TermName xmlns="http://schemas.microsoft.com/office/infopath/2007/PartnerControls">No solution</TermName>
-          <TermId xmlns="http://schemas.microsoft.com/office/infopath/2007/PartnerControls">227ba552-7fd7-40d5-abf3-76f160b7a704</TermId>
-        </TermInfo>
-      </Terms>
-    </ba46f578df2f4cc59a79294d268b0c87>
-    <_dlc_DocId xmlns="6dedcb10-c833-433a-ac85-a71007a78acc">KJNT26DDK5R3-2073477213-2081</_dlc_DocId>
-    <_dlc_DocIdUrl xmlns="6dedcb10-c833-433a-ac85-a71007a78acc">
-      <Url>https://tecalliance.sharepoint.com/sites/TA_Templates/_layouts/15/DocIdRedir.aspx?ID=KJNT26DDK5R3-2073477213-2081</Url>
-      <Description>KJNT26DDK5R3-2073477213-2081</Description>
-    </_dlc_DocIdUrl>
-  </documentManagement>
-</p:properties>
-</file>
-
-<file path=customXml/item2.xml><?xml version="1.0" encoding="utf-8"?>
 <ct:contentTypeSchema xmlns:ct="http://schemas.microsoft.com/office/2006/metadata/contentType" xmlns:ma="http://schemas.microsoft.com/office/2006/metadata/properties/metaAttributes" ct:_="" ma:_="" ma:contentTypeName="Document" ma:contentTypeID="0x010100CCD2CB7645A6664EBA7D2C1B319298D9" ma:contentTypeVersion="20" ma:contentTypeDescription="Create a new document." ma:contentTypeScope="" ma:versionID="1b89333854ece0126e4211b82251641e">
   <xsd:schema xmlns:xsd="http://www.w3.org/2001/XMLSchema" xmlns:xs="http://www.w3.org/2001/XMLSchema" xmlns:p="http://schemas.microsoft.com/office/2006/metadata/properties" xmlns:ns2="6dedcb10-c833-433a-ac85-a71007a78acc" xmlns:ns3="51e2b858-bf58-46a2-91b2-3dafa82a619b" targetNamespace="http://schemas.microsoft.com/office/2006/metadata/properties" ma:root="true" ma:fieldsID="ff5f21df02492c208f9b75ad1252c953" ns2:_="" ns3:_="">
     <xsd:import namespace="6dedcb10-c833-433a-ac85-a71007a78acc"/>
@@ -7833,7 +7782,67 @@
 </ct:contentTypeSchema>
 </file>
 
+<file path=customXml/item2.xml><?xml version="1.0" encoding="utf-8"?>
+<p:properties xmlns:p="http://schemas.microsoft.com/office/2006/metadata/properties" xmlns:xsi="http://www.w3.org/2001/XMLSchema-instance" xmlns:pc="http://schemas.microsoft.com/office/infopath/2007/PartnerControls">
+  <documentManagement>
+    <TaxCatchAll xmlns="6dedcb10-c833-433a-ac85-a71007a78acc">
+      <Value>4</Value>
+      <Value>10</Value>
+      <Value>2</Value>
+      <Value>3</Value>
+    </TaxCatchAll>
+    <Abstract xmlns="51e2b858-bf58-46a2-91b2-3dafa82a619b" xsi:nil="true"/>
+    <neda87fc916d4e679a7e41b9a8103b08 xmlns="51e2b858-bf58-46a2-91b2-3dafa82a619b">
+      <Terms xmlns="http://schemas.microsoft.com/office/infopath/2007/PartnerControls">
+        <TermInfo xmlns="http://schemas.microsoft.com/office/infopath/2007/PartnerControls">
+          <TermName xmlns="http://schemas.microsoft.com/office/infopath/2007/PartnerControls">C - valid</TermName>
+          <TermId xmlns="http://schemas.microsoft.com/office/infopath/2007/PartnerControls">0c95109a-f409-44c4-ba27-12fbc6f76f24</TermId>
+        </TermInfo>
+      </Terms>
+    </neda87fc916d4e679a7e41b9a8103b08>
+    <j1058322525a448cbab87226107f51c4 xmlns="51e2b858-bf58-46a2-91b2-3dafa82a619b">
+      <Terms xmlns="http://schemas.microsoft.com/office/infopath/2007/PartnerControls">
+        <TermInfo xmlns="http://schemas.microsoft.com/office/infopath/2007/PartnerControls">
+          <TermName xmlns="http://schemas.microsoft.com/office/infopath/2007/PartnerControls">Documentation</TermName>
+          <TermId xmlns="http://schemas.microsoft.com/office/infopath/2007/PartnerControls">4374477c-d144-4e1f-bf15-77ba8dc2d6ee</TermId>
+        </TermInfo>
+      </Terms>
+    </j1058322525a448cbab87226107f51c4>
+    <fad0ae6618ec41d8bed90675241c3993 xmlns="51e2b858-bf58-46a2-91b2-3dafa82a619b">
+      <Terms xmlns="http://schemas.microsoft.com/office/infopath/2007/PartnerControls">
+        <TermInfo xmlns="http://schemas.microsoft.com/office/infopath/2007/PartnerControls">
+          <TermName xmlns="http://schemas.microsoft.com/office/infopath/2007/PartnerControls">A - internal</TermName>
+          <TermId xmlns="http://schemas.microsoft.com/office/infopath/2007/PartnerControls">b9f71f92-fb46-4487-9019-025349c14948</TermId>
+        </TermInfo>
+      </Terms>
+    </fad0ae6618ec41d8bed90675241c3993>
+    <ba46f578df2f4cc59a79294d268b0c87 xmlns="51e2b858-bf58-46a2-91b2-3dafa82a619b">
+      <Terms xmlns="http://schemas.microsoft.com/office/infopath/2007/PartnerControls">
+        <TermInfo xmlns="http://schemas.microsoft.com/office/infopath/2007/PartnerControls">
+          <TermName xmlns="http://schemas.microsoft.com/office/infopath/2007/PartnerControls">No solution</TermName>
+          <TermId xmlns="http://schemas.microsoft.com/office/infopath/2007/PartnerControls">227ba552-7fd7-40d5-abf3-76f160b7a704</TermId>
+        </TermInfo>
+      </Terms>
+    </ba46f578df2f4cc59a79294d268b0c87>
+    <_dlc_DocId xmlns="6dedcb10-c833-433a-ac85-a71007a78acc">KJNT26DDK5R3-2073477213-2081</_dlc_DocId>
+    <_dlc_DocIdUrl xmlns="6dedcb10-c833-433a-ac85-a71007a78acc">
+      <Url>https://tecalliance.sharepoint.com/sites/TA_Templates/_layouts/15/DocIdRedir.aspx?ID=KJNT26DDK5R3-2073477213-2081</Url>
+      <Description>KJNT26DDK5R3-2073477213-2081</Description>
+    </_dlc_DocIdUrl>
+  </documentManagement>
+</p:properties>
+</file>
+
 <file path=customXml/item3.xml><?xml version="1.0" encoding="utf-8"?>
+<?mso-contentType ?>
+<FormTemplates xmlns="http://schemas.microsoft.com/sharepoint/v3/contenttype/forms">
+  <Display>DocumentLibraryForm</Display>
+  <Edit>DocumentLibraryForm</Edit>
+  <New>DocumentLibraryForm</New>
+</FormTemplates>
+</file>
+
+<file path=customXml/item4.xml><?xml version="1.0" encoding="utf-8"?>
 <?mso-contentType ?>
 <spe:Receivers xmlns:spe="http://schemas.microsoft.com/sharepoint/events">
   <Receiver>
@@ -7883,16 +7892,26 @@
 </spe:Receivers>
 </file>
 
-<file path=customXml/item4.xml><?xml version="1.0" encoding="utf-8"?>
-<?mso-contentType ?>
-<FormTemplates xmlns="http://schemas.microsoft.com/sharepoint/v3/contenttype/forms">
-  <Display>DocumentLibraryForm</Display>
-  <Edit>DocumentLibraryForm</Edit>
-  <New>DocumentLibraryForm</New>
-</FormTemplates>
+<file path=customXml/itemProps1.xml><?xml version="1.0" encoding="utf-8"?>
+<ds:datastoreItem xmlns:ds="http://schemas.openxmlformats.org/officeDocument/2006/customXml" ds:itemID="{DB98A7B3-6CBB-482F-883D-79C2A86A89A9}">
+  <ds:schemaRefs>
+    <ds:schemaRef ds:uri="http://schemas.microsoft.com/office/2006/metadata/contentType"/>
+    <ds:schemaRef ds:uri="http://schemas.microsoft.com/office/2006/metadata/properties/metaAttributes"/>
+    <ds:schemaRef ds:uri="http://www.w3.org/2001/XMLSchema"/>
+    <ds:schemaRef ds:uri="http://schemas.microsoft.com/office/2006/metadata/properties"/>
+    <ds:schemaRef ds:uri="6dedcb10-c833-433a-ac85-a71007a78acc"/>
+    <ds:schemaRef ds:uri="51e2b858-bf58-46a2-91b2-3dafa82a619b"/>
+    <ds:schemaRef ds:uri="http://schemas.microsoft.com/office/2006/documentManagement/types"/>
+    <ds:schemaRef ds:uri="http://schemas.microsoft.com/office/infopath/2007/PartnerControls"/>
+    <ds:schemaRef ds:uri="http://schemas.openxmlformats.org/package/2006/metadata/core-properties"/>
+    <ds:schemaRef ds:uri="http://purl.org/dc/elements/1.1/"/>
+    <ds:schemaRef ds:uri="http://purl.org/dc/terms/"/>
+    <ds:schemaRef ds:uri="http://schemas.microsoft.com/internal/obd"/>
+  </ds:schemaRefs>
+</ds:datastoreItem>
 </file>
 
-<file path=customXml/itemProps1.xml><?xml version="1.0" encoding="utf-8"?>
+<file path=customXml/itemProps2.xml><?xml version="1.0" encoding="utf-8"?>
 <ds:datastoreItem xmlns:ds="http://schemas.openxmlformats.org/officeDocument/2006/customXml" ds:itemID="{7949718B-A5E5-46E7-AFC7-B9ECBEAA9285}">
   <ds:schemaRefs>
     <ds:schemaRef ds:uri="http://schemas.microsoft.com/office/2006/metadata/properties"/>
@@ -7911,37 +7930,18 @@
 </ds:datastoreItem>
 </file>
 
-<file path=customXml/itemProps2.xml><?xml version="1.0" encoding="utf-8"?>
-<ds:datastoreItem xmlns:ds="http://schemas.openxmlformats.org/officeDocument/2006/customXml" ds:itemID="{DB98A7B3-6CBB-482F-883D-79C2A86A89A9}">
+<file path=customXml/itemProps3.xml><?xml version="1.0" encoding="utf-8"?>
+<ds:datastoreItem xmlns:ds="http://schemas.openxmlformats.org/officeDocument/2006/customXml" ds:itemID="{FA16A6F6-BA94-4BC1-82EC-740C029F7F2E}">
   <ds:schemaRefs>
-    <ds:schemaRef ds:uri="http://schemas.microsoft.com/office/2006/metadata/contentType"/>
-    <ds:schemaRef ds:uri="http://schemas.microsoft.com/office/2006/metadata/properties/metaAttributes"/>
-    <ds:schemaRef ds:uri="http://www.w3.org/2001/XMLSchema"/>
-    <ds:schemaRef ds:uri="http://schemas.microsoft.com/office/2006/metadata/properties"/>
-    <ds:schemaRef ds:uri="6dedcb10-c833-433a-ac85-a71007a78acc"/>
-    <ds:schemaRef ds:uri="51e2b858-bf58-46a2-91b2-3dafa82a619b"/>
-    <ds:schemaRef ds:uri="http://schemas.microsoft.com/office/2006/documentManagement/types"/>
-    <ds:schemaRef ds:uri="http://schemas.microsoft.com/office/infopath/2007/PartnerControls"/>
-    <ds:schemaRef ds:uri="http://schemas.openxmlformats.org/package/2006/metadata/core-properties"/>
-    <ds:schemaRef ds:uri="http://purl.org/dc/elements/1.1/"/>
-    <ds:schemaRef ds:uri="http://purl.org/dc/terms/"/>
-    <ds:schemaRef ds:uri="http://schemas.microsoft.com/internal/obd"/>
+    <ds:schemaRef ds:uri="http://schemas.microsoft.com/sharepoint/v3/contenttype/forms"/>
   </ds:schemaRefs>
 </ds:datastoreItem>
 </file>
 
-<file path=customXml/itemProps3.xml><?xml version="1.0" encoding="utf-8"?>
+<file path=customXml/itemProps4.xml><?xml version="1.0" encoding="utf-8"?>
 <ds:datastoreItem xmlns:ds="http://schemas.openxmlformats.org/officeDocument/2006/customXml" ds:itemID="{C2D3F007-E527-40F2-825C-916613B331EC}">
   <ds:schemaRefs>
     <ds:schemaRef ds:uri="http://schemas.microsoft.com/sharepoint/events"/>
   </ds:schemaRefs>
 </ds:datastoreItem>
-</file>
-
-<file path=customXml/itemProps4.xml><?xml version="1.0" encoding="utf-8"?>
-<ds:datastoreItem xmlns:ds="http://schemas.openxmlformats.org/officeDocument/2006/customXml" ds:itemID="{FA16A6F6-BA94-4BC1-82EC-740C029F7F2E}">
-  <ds:schemaRefs>
-    <ds:schemaRef ds:uri="http://schemas.microsoft.com/sharepoint/v3/contenttype/forms"/>
-  </ds:schemaRefs>
-</ds:datastoreItem>
 </file>
</xml_diff>